<commit_message>
Update lecture 08 slides.
</commit_message>
<xml_diff>
--- a/bishops/cs321/resources/CS321_Lecture_08B.pptx
+++ b/bishops/cs321/resources/CS321_Lecture_08B.pptx
@@ -5,7 +5,7 @@
     <p:sldMasterId id="2147483648" r:id="rId1"/>
   </p:sldMasterIdLst>
   <p:notesMasterIdLst>
-    <p:notesMasterId r:id="rId24"/>
+    <p:notesMasterId r:id="rId26"/>
   </p:notesMasterIdLst>
   <p:sldIdLst>
     <p:sldId id="256" r:id="rId2"/>
@@ -30,6 +30,8 @@
     <p:sldId id="277" r:id="rId21"/>
     <p:sldId id="278" r:id="rId22"/>
     <p:sldId id="279" r:id="rId23"/>
+    <p:sldId id="280" r:id="rId24"/>
+    <p:sldId id="281" r:id="rId25"/>
   </p:sldIdLst>
   <p:sldSz cx="12192000" cy="6858000"/>
   <p:notesSz cx="6858000" cy="9144000"/>
@@ -230,7 +232,7 @@
           <a:p>
             <a:fld id="{A6583E9D-07AB-4C6D-BFD0-47E805C6B3D4}" type="datetimeFigureOut">
               <a:rPr lang="en-CA" smtClean="0"/>
-              <a:t>2022-02-05</a:t>
+              <a:t>2022-02-08</a:t>
             </a:fld>
             <a:endParaRPr lang="en-CA"/>
           </a:p>
@@ -17983,6 +17985,445 @@
     <p:extLst>
       <p:ext uri="{BB962C8B-B14F-4D97-AF65-F5344CB8AC3E}">
         <p14:creationId xmlns:p14="http://schemas.microsoft.com/office/powerpoint/2010/main" val="3795133451"/>
+      </p:ext>
+    </p:extLst>
+  </p:cSld>
+  <p:clrMapOvr>
+    <a:masterClrMapping/>
+  </p:clrMapOvr>
+</p:sld>
+</file>
+
+<file path=ppt/slides/slide23.xml><?xml version="1.0" encoding="utf-8"?>
+<p:sld xmlns:a="http://schemas.openxmlformats.org/drawingml/2006/main" xmlns:r="http://schemas.openxmlformats.org/officeDocument/2006/relationships" xmlns:p="http://schemas.openxmlformats.org/presentationml/2006/main">
+  <p:cSld>
+    <p:spTree>
+      <p:nvGrpSpPr>
+        <p:cNvPr id="1" name=""/>
+        <p:cNvGrpSpPr/>
+        <p:nvPr/>
+      </p:nvGrpSpPr>
+      <p:grpSpPr>
+        <a:xfrm>
+          <a:off x="0" y="0"/>
+          <a:ext cx="0" cy="0"/>
+          <a:chOff x="0" y="0"/>
+          <a:chExt cx="0" cy="0"/>
+        </a:xfrm>
+      </p:grpSpPr>
+      <p:sp>
+        <p:nvSpPr>
+          <p:cNvPr id="2" name="Title 1">
+            <a:extLst>
+              <a:ext uri="{FF2B5EF4-FFF2-40B4-BE49-F238E27FC236}">
+                <a16:creationId xmlns:a16="http://schemas.microsoft.com/office/drawing/2014/main" id="{B08887DC-A630-4B20-8A23-2C6A5715CA0E}"/>
+              </a:ext>
+            </a:extLst>
+          </p:cNvPr>
+          <p:cNvSpPr>
+            <a:spLocks noGrp="1"/>
+          </p:cNvSpPr>
+          <p:nvPr>
+            <p:ph type="title"/>
+          </p:nvPr>
+        </p:nvSpPr>
+        <p:spPr/>
+        <p:txBody>
+          <a:bodyPr/>
+          <a:lstStyle/>
+          <a:p>
+            <a:r>
+              <a:rPr lang="en-CA" dirty="0"/>
+              <a:t>Tips</a:t>
+            </a:r>
+          </a:p>
+        </p:txBody>
+      </p:sp>
+      <p:sp>
+        <p:nvSpPr>
+          <p:cNvPr id="3" name="Content Placeholder 2">
+            <a:extLst>
+              <a:ext uri="{FF2B5EF4-FFF2-40B4-BE49-F238E27FC236}">
+                <a16:creationId xmlns:a16="http://schemas.microsoft.com/office/drawing/2014/main" id="{DAE30B42-7978-4613-AB8C-CE4888EFAF5A}"/>
+              </a:ext>
+            </a:extLst>
+          </p:cNvPr>
+          <p:cNvSpPr>
+            <a:spLocks noGrp="1"/>
+          </p:cNvSpPr>
+          <p:nvPr>
+            <p:ph idx="1"/>
+          </p:nvPr>
+        </p:nvSpPr>
+        <p:spPr>
+          <a:xfrm>
+            <a:off x="640874" y="1168400"/>
+            <a:ext cx="10515600" cy="5311057"/>
+          </a:xfrm>
+        </p:spPr>
+        <p:txBody>
+          <a:bodyPr>
+            <a:normAutofit lnSpcReduction="10000"/>
+          </a:bodyPr>
+          <a:lstStyle/>
+          <a:p>
+            <a:r>
+              <a:rPr lang="en-CA" dirty="0"/>
+              <a:t>General procedure for making changes to repos that aren’t your own:</a:t>
+            </a:r>
+          </a:p>
+          <a:p>
+            <a:pPr lvl="1"/>
+            <a:r>
+              <a:rPr lang="en-CA" dirty="0"/>
+              <a:t>Fork -&gt; Clone -&gt; Branch -&gt; Make Changes -&gt; Push Branch to your origin -&gt; Make PR</a:t>
+            </a:r>
+          </a:p>
+          <a:p>
+            <a:r>
+              <a:rPr lang="en-CA" dirty="0"/>
+              <a:t>When you work on your own in a single repo, it’s ok to commit directly to the default-branch/trunk. </a:t>
+            </a:r>
+            <a:r>
+              <a:rPr lang="en-CA" b="1" dirty="0"/>
+              <a:t>DO NOT DO THIS if you aren’t in your own repo. Follow the method above.</a:t>
+            </a:r>
+          </a:p>
+          <a:p>
+            <a:r>
+              <a:rPr lang="en-CA" dirty="0"/>
+              <a:t>Make small commits. Keep them limited to a single thing (multiple changes should be multiple commits).</a:t>
+            </a:r>
+          </a:p>
+          <a:p>
+            <a:pPr lvl="1"/>
+            <a:r>
+              <a:rPr lang="en-CA" dirty="0"/>
+              <a:t>E.g.:</a:t>
+            </a:r>
+          </a:p>
+          <a:p>
+            <a:pPr lvl="2"/>
+            <a:r>
+              <a:rPr lang="en-CA" dirty="0"/>
+              <a:t>Commit for testing.</a:t>
+            </a:r>
+          </a:p>
+          <a:p>
+            <a:pPr lvl="2"/>
+            <a:r>
+              <a:rPr lang="en-CA" dirty="0"/>
+              <a:t>Commit for code changes.</a:t>
+            </a:r>
+          </a:p>
+          <a:p>
+            <a:r>
+              <a:rPr lang="en-CA" dirty="0"/>
+              <a:t>Use the imperative tense in your commits:</a:t>
+            </a:r>
+          </a:p>
+          <a:p>
+            <a:pPr lvl="1"/>
+            <a:r>
+              <a:rPr lang="en-CA" dirty="0"/>
+              <a:t>“Add code for binary search.”</a:t>
+            </a:r>
+          </a:p>
+          <a:p>
+            <a:pPr lvl="1"/>
+            <a:r>
+              <a:rPr lang="en-CA" dirty="0"/>
+              <a:t>“Have the binary search method return an index.”</a:t>
+            </a:r>
+          </a:p>
+        </p:txBody>
+      </p:sp>
+      <p:sp>
+        <p:nvSpPr>
+          <p:cNvPr id="4" name="Date Placeholder 3">
+            <a:extLst>
+              <a:ext uri="{FF2B5EF4-FFF2-40B4-BE49-F238E27FC236}">
+                <a16:creationId xmlns:a16="http://schemas.microsoft.com/office/drawing/2014/main" id="{24A9FD4E-545C-4F45-B6EA-7F626A367A9A}"/>
+              </a:ext>
+            </a:extLst>
+          </p:cNvPr>
+          <p:cNvSpPr>
+            <a:spLocks noGrp="1"/>
+          </p:cNvSpPr>
+          <p:nvPr>
+            <p:ph type="dt" sz="half" idx="2"/>
+          </p:nvPr>
+        </p:nvSpPr>
+        <p:spPr/>
+        <p:txBody>
+          <a:bodyPr/>
+          <a:lstStyle/>
+          <a:p>
+            <a:r>
+              <a:rPr lang="en-US"/>
+              <a:t>Fall 2016</a:t>
+            </a:r>
+            <a:endParaRPr lang="en-CA"/>
+          </a:p>
+        </p:txBody>
+      </p:sp>
+      <p:sp>
+        <p:nvSpPr>
+          <p:cNvPr id="5" name="Footer Placeholder 4">
+            <a:extLst>
+              <a:ext uri="{FF2B5EF4-FFF2-40B4-BE49-F238E27FC236}">
+                <a16:creationId xmlns:a16="http://schemas.microsoft.com/office/drawing/2014/main" id="{0FEDDAE0-4382-48FA-8042-220FFB70EC67}"/>
+              </a:ext>
+            </a:extLst>
+          </p:cNvPr>
+          <p:cNvSpPr>
+            <a:spLocks noGrp="1"/>
+          </p:cNvSpPr>
+          <p:nvPr>
+            <p:ph type="ftr" sz="quarter" idx="3"/>
+          </p:nvPr>
+        </p:nvSpPr>
+        <p:spPr/>
+        <p:txBody>
+          <a:bodyPr/>
+          <a:lstStyle/>
+          <a:p>
+            <a:r>
+              <a:rPr lang="en-CA"/>
+              <a:t>CS 499: Honors Dissertation</a:t>
+            </a:r>
+            <a:endParaRPr lang="en-CA" dirty="0"/>
+          </a:p>
+        </p:txBody>
+      </p:sp>
+      <p:sp>
+        <p:nvSpPr>
+          <p:cNvPr id="6" name="Slide Number Placeholder 5">
+            <a:extLst>
+              <a:ext uri="{FF2B5EF4-FFF2-40B4-BE49-F238E27FC236}">
+                <a16:creationId xmlns:a16="http://schemas.microsoft.com/office/drawing/2014/main" id="{8C653258-D13D-4A11-9C22-320BD1646A47}"/>
+              </a:ext>
+            </a:extLst>
+          </p:cNvPr>
+          <p:cNvSpPr>
+            <a:spLocks noGrp="1"/>
+          </p:cNvSpPr>
+          <p:nvPr>
+            <p:ph type="sldNum" sz="quarter" idx="4"/>
+          </p:nvPr>
+        </p:nvSpPr>
+        <p:spPr/>
+        <p:txBody>
+          <a:bodyPr/>
+          <a:lstStyle/>
+          <a:p>
+            <a:fld id="{5174927E-2439-42C0-9720-7BBCA09BF46F}" type="slidenum">
+              <a:rPr lang="en-CA" smtClean="0"/>
+              <a:pPr/>
+              <a:t>23</a:t>
+            </a:fld>
+            <a:r>
+              <a:rPr lang="en-CA"/>
+              <a:t> / 32</a:t>
+            </a:r>
+            <a:endParaRPr lang="en-CA" dirty="0"/>
+          </a:p>
+        </p:txBody>
+      </p:sp>
+    </p:spTree>
+    <p:extLst>
+      <p:ext uri="{BB962C8B-B14F-4D97-AF65-F5344CB8AC3E}">
+        <p14:creationId xmlns:p14="http://schemas.microsoft.com/office/powerpoint/2010/main" val="3729054654"/>
+      </p:ext>
+    </p:extLst>
+  </p:cSld>
+  <p:clrMapOvr>
+    <a:masterClrMapping/>
+  </p:clrMapOvr>
+</p:sld>
+</file>
+
+<file path=ppt/slides/slide24.xml><?xml version="1.0" encoding="utf-8"?>
+<p:sld xmlns:a="http://schemas.openxmlformats.org/drawingml/2006/main" xmlns:r="http://schemas.openxmlformats.org/officeDocument/2006/relationships" xmlns:p="http://schemas.openxmlformats.org/presentationml/2006/main">
+  <p:cSld>
+    <p:spTree>
+      <p:nvGrpSpPr>
+        <p:cNvPr id="1" name=""/>
+        <p:cNvGrpSpPr/>
+        <p:nvPr/>
+      </p:nvGrpSpPr>
+      <p:grpSpPr>
+        <a:xfrm>
+          <a:off x="0" y="0"/>
+          <a:ext cx="0" cy="0"/>
+          <a:chOff x="0" y="0"/>
+          <a:chExt cx="0" cy="0"/>
+        </a:xfrm>
+      </p:grpSpPr>
+      <p:sp>
+        <p:nvSpPr>
+          <p:cNvPr id="2" name="Title 1">
+            <a:extLst>
+              <a:ext uri="{FF2B5EF4-FFF2-40B4-BE49-F238E27FC236}">
+                <a16:creationId xmlns:a16="http://schemas.microsoft.com/office/drawing/2014/main" id="{B08887DC-A630-4B20-8A23-2C6A5715CA0E}"/>
+              </a:ext>
+            </a:extLst>
+          </p:cNvPr>
+          <p:cNvSpPr>
+            <a:spLocks noGrp="1"/>
+          </p:cNvSpPr>
+          <p:nvPr>
+            <p:ph type="title"/>
+          </p:nvPr>
+        </p:nvSpPr>
+        <p:spPr/>
+        <p:txBody>
+          <a:bodyPr/>
+          <a:lstStyle/>
+          <a:p>
+            <a:r>
+              <a:rPr lang="en-CA" dirty="0"/>
+              <a:t>Tips</a:t>
+            </a:r>
+          </a:p>
+        </p:txBody>
+      </p:sp>
+      <p:sp>
+        <p:nvSpPr>
+          <p:cNvPr id="3" name="Content Placeholder 2">
+            <a:extLst>
+              <a:ext uri="{FF2B5EF4-FFF2-40B4-BE49-F238E27FC236}">
+                <a16:creationId xmlns:a16="http://schemas.microsoft.com/office/drawing/2014/main" id="{DAE30B42-7978-4613-AB8C-CE4888EFAF5A}"/>
+              </a:ext>
+            </a:extLst>
+          </p:cNvPr>
+          <p:cNvSpPr>
+            <a:spLocks noGrp="1"/>
+          </p:cNvSpPr>
+          <p:nvPr>
+            <p:ph idx="1"/>
+          </p:nvPr>
+        </p:nvSpPr>
+        <p:spPr>
+          <a:xfrm>
+            <a:off x="640874" y="1168400"/>
+            <a:ext cx="10515600" cy="5311057"/>
+          </a:xfrm>
+        </p:spPr>
+        <p:txBody>
+          <a:bodyPr>
+            <a:normAutofit/>
+          </a:bodyPr>
+          <a:lstStyle/>
+          <a:p>
+            <a:r>
+              <a:rPr lang="en-CA" dirty="0"/>
+              <a:t>In general, you’ll be able to get away with using git </a:t>
+            </a:r>
+            <a:r>
+              <a:rPr lang="en-CA"/>
+              <a:t>rebase.</a:t>
+            </a:r>
+            <a:endParaRPr lang="en-CA" dirty="0"/>
+          </a:p>
+        </p:txBody>
+      </p:sp>
+      <p:sp>
+        <p:nvSpPr>
+          <p:cNvPr id="4" name="Date Placeholder 3">
+            <a:extLst>
+              <a:ext uri="{FF2B5EF4-FFF2-40B4-BE49-F238E27FC236}">
+                <a16:creationId xmlns:a16="http://schemas.microsoft.com/office/drawing/2014/main" id="{24A9FD4E-545C-4F45-B6EA-7F626A367A9A}"/>
+              </a:ext>
+            </a:extLst>
+          </p:cNvPr>
+          <p:cNvSpPr>
+            <a:spLocks noGrp="1"/>
+          </p:cNvSpPr>
+          <p:nvPr>
+            <p:ph type="dt" sz="half" idx="2"/>
+          </p:nvPr>
+        </p:nvSpPr>
+        <p:spPr/>
+        <p:txBody>
+          <a:bodyPr/>
+          <a:lstStyle/>
+          <a:p>
+            <a:r>
+              <a:rPr lang="en-US"/>
+              <a:t>Fall 2016</a:t>
+            </a:r>
+            <a:endParaRPr lang="en-CA"/>
+          </a:p>
+        </p:txBody>
+      </p:sp>
+      <p:sp>
+        <p:nvSpPr>
+          <p:cNvPr id="5" name="Footer Placeholder 4">
+            <a:extLst>
+              <a:ext uri="{FF2B5EF4-FFF2-40B4-BE49-F238E27FC236}">
+                <a16:creationId xmlns:a16="http://schemas.microsoft.com/office/drawing/2014/main" id="{0FEDDAE0-4382-48FA-8042-220FFB70EC67}"/>
+              </a:ext>
+            </a:extLst>
+          </p:cNvPr>
+          <p:cNvSpPr>
+            <a:spLocks noGrp="1"/>
+          </p:cNvSpPr>
+          <p:nvPr>
+            <p:ph type="ftr" sz="quarter" idx="3"/>
+          </p:nvPr>
+        </p:nvSpPr>
+        <p:spPr/>
+        <p:txBody>
+          <a:bodyPr/>
+          <a:lstStyle/>
+          <a:p>
+            <a:r>
+              <a:rPr lang="en-CA"/>
+              <a:t>CS 499: Honors Dissertation</a:t>
+            </a:r>
+            <a:endParaRPr lang="en-CA" dirty="0"/>
+          </a:p>
+        </p:txBody>
+      </p:sp>
+      <p:sp>
+        <p:nvSpPr>
+          <p:cNvPr id="6" name="Slide Number Placeholder 5">
+            <a:extLst>
+              <a:ext uri="{FF2B5EF4-FFF2-40B4-BE49-F238E27FC236}">
+                <a16:creationId xmlns:a16="http://schemas.microsoft.com/office/drawing/2014/main" id="{8C653258-D13D-4A11-9C22-320BD1646A47}"/>
+              </a:ext>
+            </a:extLst>
+          </p:cNvPr>
+          <p:cNvSpPr>
+            <a:spLocks noGrp="1"/>
+          </p:cNvSpPr>
+          <p:nvPr>
+            <p:ph type="sldNum" sz="quarter" idx="4"/>
+          </p:nvPr>
+        </p:nvSpPr>
+        <p:spPr/>
+        <p:txBody>
+          <a:bodyPr/>
+          <a:lstStyle/>
+          <a:p>
+            <a:fld id="{5174927E-2439-42C0-9720-7BBCA09BF46F}" type="slidenum">
+              <a:rPr lang="en-CA" smtClean="0"/>
+              <a:pPr/>
+              <a:t>24</a:t>
+            </a:fld>
+            <a:r>
+              <a:rPr lang="en-CA"/>
+              <a:t> / 32</a:t>
+            </a:r>
+            <a:endParaRPr lang="en-CA" dirty="0"/>
+          </a:p>
+        </p:txBody>
+      </p:sp>
+    </p:spTree>
+    <p:extLst>
+      <p:ext uri="{BB962C8B-B14F-4D97-AF65-F5344CB8AC3E}">
+        <p14:creationId xmlns:p14="http://schemas.microsoft.com/office/powerpoint/2010/main" val="259456648"/>
       </p:ext>
     </p:extLst>
   </p:cSld>

</xml_diff>